<commit_message>
fixes from jleroux comments
- Xbits => X-bit
- Add Exceptions in trace profiling
</commit_message>
<xml_diff>
--- a/VEEPortingGuide/images/mjvm_block-diagram.pptx
+++ b/VEEPortingGuide/images/mjvm_block-diagram.pptx
@@ -8248,7 +8248,7 @@
                   <a:latin typeface="Source Sans Pro" panose="020B0503030403020204" pitchFamily="34" charset="0"/>
                   <a:ea typeface="Source Sans Pro" panose="020B0503030403020204" pitchFamily="34" charset="0"/>
                 </a:rPr>
-                <a:t>• FPU 32bits &amp; 64bits</a:t>
+                <a:t>• FPU 32-bit &amp; 64-bit</a:t>
               </a:r>
             </a:p>
             <a:p>
@@ -8260,7 +8260,7 @@
                   <a:latin typeface="Source Sans Pro" panose="020B0503030403020204" pitchFamily="34" charset="0"/>
                   <a:ea typeface="Source Sans Pro" panose="020B0503030403020204" pitchFamily="34" charset="0"/>
                 </a:rPr>
-                <a:t>• 16bits Pointers(*)</a:t>
+                <a:t>• 16-bit Pointers(*)</a:t>
               </a:r>
             </a:p>
             <a:p>
@@ -8511,8 +8511,8 @@
         </p:nvSpPr>
         <p:spPr>
           <a:xfrm>
-            <a:off x="615534" y="1726678"/>
-            <a:ext cx="2156338" cy="2993477"/>
+            <a:off x="615534" y="1651176"/>
+            <a:ext cx="2156338" cy="3156001"/>
           </a:xfrm>
           <a:prstGeom prst="roundRect">
             <a:avLst>
@@ -8577,7 +8577,7 @@
         </p:nvSpPr>
         <p:spPr>
           <a:xfrm>
-            <a:off x="783566" y="2088732"/>
+            <a:off x="783566" y="2013231"/>
             <a:ext cx="1800000" cy="263845"/>
           </a:xfrm>
           <a:prstGeom prst="roundRect">
@@ -8641,7 +8641,7 @@
         </p:nvSpPr>
         <p:spPr>
           <a:xfrm>
-            <a:off x="783564" y="2458678"/>
+            <a:off x="783564" y="2383177"/>
             <a:ext cx="1800000" cy="259463"/>
           </a:xfrm>
           <a:prstGeom prst="roundRect">
@@ -8705,7 +8705,7 @@
         </p:nvSpPr>
         <p:spPr>
           <a:xfrm>
-            <a:off x="783565" y="2822364"/>
+            <a:off x="783565" y="2746863"/>
             <a:ext cx="1800000" cy="259463"/>
           </a:xfrm>
           <a:prstGeom prst="roundRect">
@@ -8769,7 +8769,7 @@
         </p:nvSpPr>
         <p:spPr>
           <a:xfrm>
-            <a:off x="781646" y="3190119"/>
+            <a:off x="781646" y="3114618"/>
             <a:ext cx="1800000" cy="259463"/>
           </a:xfrm>
           <a:prstGeom prst="roundRect">
@@ -8833,7 +8833,7 @@
         </p:nvSpPr>
         <p:spPr>
           <a:xfrm>
-            <a:off x="781646" y="3557874"/>
+            <a:off x="781646" y="3482373"/>
             <a:ext cx="1800000" cy="360000"/>
           </a:xfrm>
           <a:prstGeom prst="roundRect">
@@ -8910,8 +8910,8 @@
         </p:nvSpPr>
         <p:spPr>
           <a:xfrm>
-            <a:off x="781647" y="4015446"/>
-            <a:ext cx="1800000" cy="580880"/>
+            <a:off x="781647" y="3931805"/>
+            <a:ext cx="1800000" cy="748163"/>
           </a:xfrm>
           <a:prstGeom prst="roundRect">
             <a:avLst>
@@ -8982,6 +8982,18 @@
               <a:t>• Object Allocations</a:t>
             </a:r>
           </a:p>
+          <a:p>
+            <a:r>
+              <a:rPr lang="en-GB" sz="1000" dirty="0">
+                <a:solidFill>
+                  <a:schemeClr val="tx1"/>
+                </a:solidFill>
+                <a:latin typeface="Source Sans Pro" panose="020B0503030403020204" pitchFamily="34" charset="0"/>
+                <a:ea typeface="Source Sans Pro" panose="020B0503030403020204" pitchFamily="34" charset="0"/>
+              </a:rPr>
+              <a:t>• Exceptions</a:t>
+            </a:r>
+          </a:p>
         </p:txBody>
       </p:sp>
       <p:cxnSp>
@@ -9002,8 +9014,8 @@
         </p:nvCxnSpPr>
         <p:spPr>
           <a:xfrm>
-            <a:off x="2771872" y="3223417"/>
-            <a:ext cx="370891" cy="7093"/>
+            <a:off x="2771872" y="3229177"/>
+            <a:ext cx="370891" cy="1333"/>
           </a:xfrm>
           <a:prstGeom prst="straightConnector1">
             <a:avLst/>

</xml_diff>

<commit_message>
update block diagram Application Data
- invert Code & Resources
- add access modes
- add internal resources
</commit_message>
<xml_diff>
--- a/VEEPortingGuide/images/mjvm_block-diagram.pptx
+++ b/VEEPortingGuide/images/mjvm_block-diagram.pptx
@@ -8292,8 +8292,8 @@
         </p:nvSpPr>
         <p:spPr>
           <a:xfrm>
-            <a:off x="3142763" y="650139"/>
-            <a:ext cx="6059389" cy="924647"/>
+            <a:off x="3142763" y="232615"/>
+            <a:ext cx="6059389" cy="1342172"/>
           </a:xfrm>
           <a:prstGeom prst="roundRect">
             <a:avLst>
@@ -8358,8 +8358,8 @@
         </p:nvSpPr>
         <p:spPr>
           <a:xfrm>
-            <a:off x="7122141" y="1004613"/>
-            <a:ext cx="1931860" cy="470918"/>
+            <a:off x="3282234" y="629093"/>
+            <a:ext cx="1931860" cy="858585"/>
           </a:xfrm>
           <a:prstGeom prst="roundRect">
             <a:avLst>
@@ -8390,7 +8390,7 @@
         </p:style>
         <p:txBody>
           <a:bodyPr wrap="square" tIns="36000" bIns="36000" rtlCol="0" anchor="ctr">
-            <a:spAutoFit/>
+            <a:noAutofit/>
           </a:bodyPr>
           <a:lstStyle/>
           <a:p>
@@ -8408,6 +8408,16 @@
           </a:p>
           <a:p>
             <a:pPr algn="ctr"/>
+            <a:endParaRPr lang="en-GB" sz="1200" b="1" dirty="0">
+              <a:solidFill>
+                <a:schemeClr val="tx1"/>
+              </a:solidFill>
+              <a:latin typeface="Source Sans Pro" panose="020B0503030403020204" pitchFamily="34" charset="0"/>
+              <a:ea typeface="Source Sans Pro" panose="020B0503030403020204" pitchFamily="34" charset="0"/>
+            </a:endParaRPr>
+          </a:p>
+          <a:p>
+            <a:pPr algn="ctr"/>
             <a:r>
               <a:rPr lang="en-US" sz="1000" dirty="0">
                 <a:solidFill>
@@ -8419,81 +8429,15 @@
               <a:t>Execution In Place (XIP)</a:t>
             </a:r>
           </a:p>
-        </p:txBody>
-      </p:sp>
-      <p:sp>
-        <p:nvSpPr>
-          <p:cNvPr id="88" name="Rounded Rectangle 64">
-            <a:extLst>
-              <a:ext uri="{FF2B5EF4-FFF2-40B4-BE49-F238E27FC236}">
-                <a16:creationId xmlns:a16="http://schemas.microsoft.com/office/drawing/2014/main" id="{08D2BB00-4D93-9348-B92D-5EB7412C328A}"/>
-              </a:ext>
-            </a:extLst>
-          </p:cNvPr>
-          <p:cNvSpPr/>
-          <p:nvPr/>
-        </p:nvSpPr>
-        <p:spPr>
-          <a:xfrm>
-            <a:off x="3261628" y="1004613"/>
-            <a:ext cx="3714110" cy="470918"/>
-          </a:xfrm>
-          <a:prstGeom prst="roundRect">
-            <a:avLst>
-              <a:gd name="adj" fmla="val 22586"/>
-            </a:avLst>
-          </a:prstGeom>
-          <a:solidFill>
-            <a:schemeClr val="bg1"/>
-          </a:solidFill>
-          <a:ln w="12700">
-            <a:noFill/>
-          </a:ln>
-          <a:effectLst/>
-        </p:spPr>
-        <p:style>
-          <a:lnRef idx="2">
-            <a:schemeClr val="dk1"/>
-          </a:lnRef>
-          <a:fillRef idx="1">
-            <a:schemeClr val="lt1"/>
-          </a:fillRef>
-          <a:effectRef idx="0">
-            <a:schemeClr val="dk1"/>
-          </a:effectRef>
-          <a:fontRef idx="minor">
-            <a:schemeClr val="dk1"/>
-          </a:fontRef>
-        </p:style>
-        <p:txBody>
-          <a:bodyPr wrap="square" tIns="36000" bIns="36000" rtlCol="0" anchor="ctr">
-            <a:spAutoFit/>
-          </a:bodyPr>
-          <a:lstStyle/>
           <a:p>
             <a:pPr algn="ctr"/>
-            <a:r>
-              <a:rPr lang="en-GB" sz="1200" b="1" dirty="0">
-                <a:solidFill>
-                  <a:schemeClr val="tx1"/>
-                </a:solidFill>
-                <a:latin typeface="Source Sans Pro" panose="020B0503030403020204" pitchFamily="34" charset="0"/>
-                <a:ea typeface="Source Sans Pro" panose="020B0503030403020204" pitchFamily="34" charset="0"/>
-              </a:rPr>
-              <a:t>Resources</a:t>
-            </a:r>
-          </a:p>
-          <a:p>
-            <a:r>
-              <a:rPr lang="en-US" sz="1000" dirty="0">
-                <a:solidFill>
-                  <a:schemeClr val="tx1"/>
-                </a:solidFill>
-                <a:latin typeface="Source Sans Pro" panose="020B0503030403020204" pitchFamily="34" charset="0"/>
-                <a:ea typeface="Source Sans Pro" panose="020B0503030403020204" pitchFamily="34" charset="0"/>
-              </a:rPr>
-              <a:t>External Resources Loader (non byte-addressable memories)</a:t>
-            </a:r>
+            <a:endParaRPr lang="en-US" sz="1000" dirty="0">
+              <a:solidFill>
+                <a:schemeClr val="tx1"/>
+              </a:solidFill>
+              <a:latin typeface="Source Sans Pro" panose="020B0503030403020204" pitchFamily="34" charset="0"/>
+              <a:ea typeface="Source Sans Pro" panose="020B0503030403020204" pitchFamily="34" charset="0"/>
+            </a:endParaRPr>
           </a:p>
         </p:txBody>
       </p:sp>
@@ -9058,8 +9002,8 @@
         </p:nvCxnSpPr>
         <p:spPr>
           <a:xfrm>
-            <a:off x="6172458" y="1574786"/>
-            <a:ext cx="6364" cy="277229"/>
+            <a:off x="6172458" y="1574787"/>
+            <a:ext cx="6364" cy="277228"/>
           </a:xfrm>
           <a:prstGeom prst="straightConnector1">
             <a:avLst/>
@@ -9781,6 +9725,148 @@
               <a:latin typeface="Source Sans Pro" panose="020B0503030403020204" pitchFamily="34" charset="0"/>
               <a:ea typeface="Source Sans Pro" panose="020B0503030403020204" pitchFamily="34" charset="0"/>
             </a:endParaRPr>
+          </a:p>
+        </p:txBody>
+      </p:sp>
+      <p:sp>
+        <p:nvSpPr>
+          <p:cNvPr id="3" name="Rounded Rectangle 64">
+            <a:extLst>
+              <a:ext uri="{FF2B5EF4-FFF2-40B4-BE49-F238E27FC236}">
+                <a16:creationId xmlns:a16="http://schemas.microsoft.com/office/drawing/2014/main" id="{83096020-8DA4-C869-4969-F34BD02510B4}"/>
+              </a:ext>
+            </a:extLst>
+          </p:cNvPr>
+          <p:cNvSpPr/>
+          <p:nvPr/>
+        </p:nvSpPr>
+        <p:spPr>
+          <a:xfrm>
+            <a:off x="5353565" y="629093"/>
+            <a:ext cx="3714110" cy="854232"/>
+          </a:xfrm>
+          <a:prstGeom prst="roundRect">
+            <a:avLst>
+              <a:gd name="adj" fmla="val 22586"/>
+            </a:avLst>
+          </a:prstGeom>
+          <a:solidFill>
+            <a:schemeClr val="bg1"/>
+          </a:solidFill>
+          <a:ln w="12700">
+            <a:noFill/>
+          </a:ln>
+          <a:effectLst/>
+        </p:spPr>
+        <p:style>
+          <a:lnRef idx="2">
+            <a:schemeClr val="dk1"/>
+          </a:lnRef>
+          <a:fillRef idx="1">
+            <a:schemeClr val="lt1"/>
+          </a:fillRef>
+          <a:effectRef idx="0">
+            <a:schemeClr val="dk1"/>
+          </a:effectRef>
+          <a:fontRef idx="minor">
+            <a:schemeClr val="dk1"/>
+          </a:fontRef>
+        </p:style>
+        <p:txBody>
+          <a:bodyPr wrap="square" tIns="36000" bIns="36000" rtlCol="0" anchor="t">
+            <a:noAutofit/>
+          </a:bodyPr>
+          <a:lstStyle/>
+          <a:p>
+            <a:pPr algn="ctr"/>
+            <a:r>
+              <a:rPr lang="en-GB" sz="1200" b="1" dirty="0">
+                <a:solidFill>
+                  <a:schemeClr val="tx1"/>
+                </a:solidFill>
+                <a:latin typeface="Source Sans Pro" panose="020B0503030403020204" pitchFamily="34" charset="0"/>
+                <a:ea typeface="Source Sans Pro" panose="020B0503030403020204" pitchFamily="34" charset="0"/>
+              </a:rPr>
+              <a:t>Resources</a:t>
+            </a:r>
+          </a:p>
+          <a:p>
+            <a:pPr marL="171450" indent="-171450">
+              <a:buFont typeface="Arial" panose="020B0604020202020204" pitchFamily="34" charset="0"/>
+              <a:buChar char="•"/>
+            </a:pPr>
+            <a:r>
+              <a:rPr lang="en-GB" sz="1000" dirty="0">
+                <a:solidFill>
+                  <a:schemeClr val="tx1"/>
+                </a:solidFill>
+                <a:latin typeface="Source Sans Pro" panose="020B0503030403020204" pitchFamily="34" charset="0"/>
+                <a:ea typeface="Source Sans Pro" panose="020B0503030403020204" pitchFamily="34" charset="0"/>
+              </a:rPr>
+              <a:t>Streaming and Seeking access modes</a:t>
+            </a:r>
+          </a:p>
+          <a:p>
+            <a:pPr marL="171450" indent="-171450">
+              <a:buFont typeface="Arial" panose="020B0604020202020204" pitchFamily="34" charset="0"/>
+              <a:buChar char="•"/>
+            </a:pPr>
+            <a:r>
+              <a:rPr lang="en-GB" sz="1000" dirty="0">
+                <a:solidFill>
+                  <a:schemeClr val="tx1"/>
+                </a:solidFill>
+                <a:latin typeface="Source Sans Pro" panose="020B0503030403020204" pitchFamily="34" charset="0"/>
+                <a:ea typeface="Source Sans Pro" panose="020B0503030403020204" pitchFamily="34" charset="0"/>
+              </a:rPr>
+              <a:t>Internal </a:t>
+            </a:r>
+            <a:r>
+              <a:rPr lang="en-US" sz="1000" dirty="0">
+                <a:solidFill>
+                  <a:schemeClr val="tx1"/>
+                </a:solidFill>
+                <a:latin typeface="Source Sans Pro" panose="020B0503030403020204" pitchFamily="34" charset="0"/>
+                <a:ea typeface="Source Sans Pro" panose="020B0503030403020204" pitchFamily="34" charset="0"/>
+              </a:rPr>
+              <a:t>Resources Linker (m</a:t>
+            </a:r>
+            <a:r>
+              <a:rPr lang="en-GB" sz="1000" dirty="0" err="1">
+                <a:solidFill>
+                  <a:schemeClr val="tx1"/>
+                </a:solidFill>
+                <a:latin typeface="Source Sans Pro" panose="020B0503030403020204" pitchFamily="34" charset="0"/>
+                <a:ea typeface="Source Sans Pro" panose="020B0503030403020204" pitchFamily="34" charset="0"/>
+              </a:rPr>
+              <a:t>emory</a:t>
+            </a:r>
+            <a:r>
+              <a:rPr lang="en-GB" sz="1000" dirty="0">
+                <a:solidFill>
+                  <a:schemeClr val="tx1"/>
+                </a:solidFill>
+                <a:latin typeface="Source Sans Pro" panose="020B0503030403020204" pitchFamily="34" charset="0"/>
+                <a:ea typeface="Source Sans Pro" panose="020B0503030403020204" pitchFamily="34" charset="0"/>
+              </a:rPr>
+              <a:t> mapped)</a:t>
+            </a:r>
+          </a:p>
+          <a:p>
+            <a:pPr marL="171450" indent="-171450">
+              <a:buFont typeface="Arial" panose="020B0604020202020204" pitchFamily="34" charset="0"/>
+              <a:buChar char="•"/>
+            </a:pPr>
+            <a:r>
+              <a:rPr lang="en-US" sz="1000" dirty="0">
+                <a:solidFill>
+                  <a:schemeClr val="tx1"/>
+                </a:solidFill>
+                <a:latin typeface="Source Sans Pro" panose="020B0503030403020204" pitchFamily="34" charset="0"/>
+                <a:ea typeface="Source Sans Pro" panose="020B0503030403020204" pitchFamily="34" charset="0"/>
+              </a:rPr>
+              <a:t>External Resources Loader (non byte-addressable memories)</a:t>
+            </a:r>
           </a:p>
         </p:txBody>
       </p:sp>

</xml_diff>